<commit_message>
final update # 10
</commit_message>
<xml_diff>
--- a/CLR_via_CSharp/Chapter 10 - Properties/Properties.pptx
+++ b/CLR_via_CSharp/Chapter 10 - Properties/Properties.pptx
@@ -16,6 +16,7 @@
     <p:sldId id="264" r:id="rId10"/>
     <p:sldId id="265" r:id="rId11"/>
     <p:sldId id="266" r:id="rId12"/>
+    <p:sldId id="267" r:id="rId13"/>
   </p:sldIdLst>
   <p:sldSz cx="12192000" cy="6858000"/>
   <p:notesSz cx="6858000" cy="9144000"/>
@@ -253,7 +254,7 @@
           <a:p>
             <a:fld id="{09D8E82A-F45F-4C7F-89E6-419FFBE908AD}" type="datetimeFigureOut">
               <a:rPr lang="en-US" smtClean="0"/>
-              <a:t>9/15/2022</a:t>
+              <a:t>9/16/2022</a:t>
             </a:fld>
             <a:endParaRPr lang="en-US"/>
           </a:p>
@@ -423,7 +424,7 @@
           <a:p>
             <a:fld id="{09D8E82A-F45F-4C7F-89E6-419FFBE908AD}" type="datetimeFigureOut">
               <a:rPr lang="en-US" smtClean="0"/>
-              <a:t>9/15/2022</a:t>
+              <a:t>9/16/2022</a:t>
             </a:fld>
             <a:endParaRPr lang="en-US"/>
           </a:p>
@@ -603,7 +604,7 @@
           <a:p>
             <a:fld id="{09D8E82A-F45F-4C7F-89E6-419FFBE908AD}" type="datetimeFigureOut">
               <a:rPr lang="en-US" smtClean="0"/>
-              <a:t>9/15/2022</a:t>
+              <a:t>9/16/2022</a:t>
             </a:fld>
             <a:endParaRPr lang="en-US"/>
           </a:p>
@@ -773,7 +774,7 @@
           <a:p>
             <a:fld id="{09D8E82A-F45F-4C7F-89E6-419FFBE908AD}" type="datetimeFigureOut">
               <a:rPr lang="en-US" smtClean="0"/>
-              <a:t>9/15/2022</a:t>
+              <a:t>9/16/2022</a:t>
             </a:fld>
             <a:endParaRPr lang="en-US"/>
           </a:p>
@@ -1019,7 +1020,7 @@
           <a:p>
             <a:fld id="{09D8E82A-F45F-4C7F-89E6-419FFBE908AD}" type="datetimeFigureOut">
               <a:rPr lang="en-US" smtClean="0"/>
-              <a:t>9/15/2022</a:t>
+              <a:t>9/16/2022</a:t>
             </a:fld>
             <a:endParaRPr lang="en-US"/>
           </a:p>
@@ -1251,7 +1252,7 @@
           <a:p>
             <a:fld id="{09D8E82A-F45F-4C7F-89E6-419FFBE908AD}" type="datetimeFigureOut">
               <a:rPr lang="en-US" smtClean="0"/>
-              <a:t>9/15/2022</a:t>
+              <a:t>9/16/2022</a:t>
             </a:fld>
             <a:endParaRPr lang="en-US"/>
           </a:p>
@@ -1618,7 +1619,7 @@
           <a:p>
             <a:fld id="{09D8E82A-F45F-4C7F-89E6-419FFBE908AD}" type="datetimeFigureOut">
               <a:rPr lang="en-US" smtClean="0"/>
-              <a:t>9/15/2022</a:t>
+              <a:t>9/16/2022</a:t>
             </a:fld>
             <a:endParaRPr lang="en-US"/>
           </a:p>
@@ -1736,7 +1737,7 @@
           <a:p>
             <a:fld id="{09D8E82A-F45F-4C7F-89E6-419FFBE908AD}" type="datetimeFigureOut">
               <a:rPr lang="en-US" smtClean="0"/>
-              <a:t>9/15/2022</a:t>
+              <a:t>9/16/2022</a:t>
             </a:fld>
             <a:endParaRPr lang="en-US"/>
           </a:p>
@@ -1831,7 +1832,7 @@
           <a:p>
             <a:fld id="{09D8E82A-F45F-4C7F-89E6-419FFBE908AD}" type="datetimeFigureOut">
               <a:rPr lang="en-US" smtClean="0"/>
-              <a:t>9/15/2022</a:t>
+              <a:t>9/16/2022</a:t>
             </a:fld>
             <a:endParaRPr lang="en-US"/>
           </a:p>
@@ -2108,7 +2109,7 @@
           <a:p>
             <a:fld id="{09D8E82A-F45F-4C7F-89E6-419FFBE908AD}" type="datetimeFigureOut">
               <a:rPr lang="en-US" smtClean="0"/>
-              <a:t>9/15/2022</a:t>
+              <a:t>9/16/2022</a:t>
             </a:fld>
             <a:endParaRPr lang="en-US"/>
           </a:p>
@@ -2365,7 +2366,7 @@
           <a:p>
             <a:fld id="{09D8E82A-F45F-4C7F-89E6-419FFBE908AD}" type="datetimeFigureOut">
               <a:rPr lang="en-US" smtClean="0"/>
-              <a:t>9/15/2022</a:t>
+              <a:t>9/16/2022</a:t>
             </a:fld>
             <a:endParaRPr lang="en-US"/>
           </a:p>
@@ -2578,7 +2579,7 @@
           <a:p>
             <a:fld id="{09D8E82A-F45F-4C7F-89E6-419FFBE908AD}" type="datetimeFigureOut">
               <a:rPr lang="en-US" smtClean="0"/>
-              <a:t>9/15/2022</a:t>
+              <a:t>9/16/2022</a:t>
             </a:fld>
             <a:endParaRPr lang="en-US"/>
           </a:p>
@@ -3335,6 +3336,93 @@
 </p:sld>
 </file>
 
+<file path=ppt/slides/slide12.xml><?xml version="1.0" encoding="utf-8"?>
+<p:sld xmlns:a="http://schemas.openxmlformats.org/drawingml/2006/main" xmlns:r="http://schemas.openxmlformats.org/officeDocument/2006/relationships" xmlns:p="http://schemas.openxmlformats.org/presentationml/2006/main">
+  <p:cSld>
+    <p:spTree>
+      <p:nvGrpSpPr>
+        <p:cNvPr id="1" name=""/>
+        <p:cNvGrpSpPr/>
+        <p:nvPr/>
+      </p:nvGrpSpPr>
+      <p:grpSpPr>
+        <a:xfrm>
+          <a:off x="0" y="0"/>
+          <a:ext cx="0" cy="0"/>
+          <a:chOff x="0" y="0"/>
+          <a:chExt cx="0" cy="0"/>
+        </a:xfrm>
+      </p:grpSpPr>
+      <p:sp>
+        <p:nvSpPr>
+          <p:cNvPr id="2" name="Title 1">
+            <a:extLst>
+              <a:ext uri="{FF2B5EF4-FFF2-40B4-BE49-F238E27FC236}">
+                <a16:creationId xmlns:a16="http://schemas.microsoft.com/office/drawing/2014/main" id="{D04CA64F-421F-A3A6-7E2C-EFE3B25DAEB1}"/>
+              </a:ext>
+            </a:extLst>
+          </p:cNvPr>
+          <p:cNvSpPr>
+            <a:spLocks noGrp="1"/>
+          </p:cNvSpPr>
+          <p:nvPr>
+            <p:ph type="title"/>
+          </p:nvPr>
+        </p:nvSpPr>
+        <p:spPr/>
+        <p:txBody>
+          <a:bodyPr/>
+          <a:lstStyle/>
+          <a:p>
+            <a:r>
+              <a:rPr lang="en-US" dirty="0"/>
+              <a:t>Bit Array 2</a:t>
+            </a:r>
+          </a:p>
+        </p:txBody>
+      </p:sp>
+      <p:pic>
+        <p:nvPicPr>
+          <p:cNvPr id="5" name="Content Placeholder 4">
+            <a:extLst>
+              <a:ext uri="{FF2B5EF4-FFF2-40B4-BE49-F238E27FC236}">
+                <a16:creationId xmlns:a16="http://schemas.microsoft.com/office/drawing/2014/main" id="{7A2465B2-5EAA-D430-F6ED-30B71D51757A}"/>
+              </a:ext>
+            </a:extLst>
+          </p:cNvPr>
+          <p:cNvPicPr>
+            <a:picLocks noGrp="1" noChangeAspect="1"/>
+          </p:cNvPicPr>
+          <p:nvPr>
+            <p:ph idx="1"/>
+          </p:nvPr>
+        </p:nvPicPr>
+        <p:blipFill>
+          <a:blip r:embed="rId2"/>
+          <a:stretch>
+            <a:fillRect/>
+          </a:stretch>
+        </p:blipFill>
+        <p:spPr>
+          <a:xfrm>
+            <a:off x="3495312" y="2877187"/>
+            <a:ext cx="5201376" cy="2248214"/>
+          </a:xfrm>
+        </p:spPr>
+      </p:pic>
+    </p:spTree>
+    <p:extLst>
+      <p:ext uri="{BB962C8B-B14F-4D97-AF65-F5344CB8AC3E}">
+        <p14:creationId xmlns:p14="http://schemas.microsoft.com/office/powerpoint/2010/main" val="3213736111"/>
+      </p:ext>
+    </p:extLst>
+  </p:cSld>
+  <p:clrMapOvr>
+    <a:masterClrMapping/>
+  </p:clrMapOvr>
+</p:sld>
+</file>
+
 <file path=ppt/slides/slide2.xml><?xml version="1.0" encoding="utf-8"?>
 <p:sld xmlns:a="http://schemas.openxmlformats.org/drawingml/2006/main" xmlns:r="http://schemas.openxmlformats.org/officeDocument/2006/relationships" xmlns:p="http://schemas.openxmlformats.org/presentationml/2006/main">
   <p:cSld>

</xml_diff>